<commit_message>
Changes for 3. Stand-Up
</commit_message>
<xml_diff>
--- a/presentation/3. Stand-Up.pptx
+++ b/presentation/3. Stand-Up.pptx
@@ -2276,7 +2276,7 @@
                 <a:spcPct val="100000"/>
               </a:lnSpc>
             </a:pPr>
-            <a:fld id="{C8BDD6A9-3948-4C65-B6E7-1D63B9B82A29}" type="slidenum">
+            <a:fld id="{EE778EF7-0B4D-49B7-AB98-5A52D7980487}" type="slidenum">
               <a:rPr b="1" lang="de-DE" sz="1000">
                 <a:solidFill>
                   <a:srgbClr val="5f5f5f"/>
@@ -2678,7 +2678,7 @@
                 <a:spcPct val="100000"/>
               </a:lnSpc>
             </a:pPr>
-            <a:fld id="{0C35C028-0A17-4168-A83A-6D907E6A75C9}" type="slidenum">
+            <a:fld id="{E82F9C13-8F17-46DB-9EF7-3D591878185F}" type="slidenum">
               <a:rPr b="1" lang="de-DE" sz="1000">
                 <a:solidFill>
                   <a:srgbClr val="5f5f5f"/>
@@ -3302,7 +3302,7 @@
                 </a:solidFill>
                 <a:latin typeface="Arial"/>
               </a:rPr>
-              <a:t>- Linkdata implementiert</a:t>
+              <a:t>- Linked Data implementiert</a:t>
             </a:r>
             <a:endParaRPr/>
           </a:p>

</xml_diff>

<commit_message>
Again changes for 3. Stand-Up
</commit_message>
<xml_diff>
--- a/presentation/3. Stand-Up.pptx
+++ b/presentation/3. Stand-Up.pptx
@@ -2276,7 +2276,7 @@
                 <a:spcPct val="100000"/>
               </a:lnSpc>
             </a:pPr>
-            <a:fld id="{EE778EF7-0B4D-49B7-AB98-5A52D7980487}" type="slidenum">
+            <a:fld id="{AA2B9DD5-5688-40BC-A812-61EA367E0D51}" type="slidenum">
               <a:rPr b="1" lang="de-DE" sz="1000">
                 <a:solidFill>
                   <a:srgbClr val="5f5f5f"/>
@@ -2678,7 +2678,7 @@
                 <a:spcPct val="100000"/>
               </a:lnSpc>
             </a:pPr>
-            <a:fld id="{E82F9C13-8F17-46DB-9EF7-3D591878185F}" type="slidenum">
+            <a:fld id="{E26D31FF-44F4-4E37-9C2F-0400C7E8491B}" type="slidenum">
               <a:rPr b="1" lang="de-DE" sz="1000">
                 <a:solidFill>
                   <a:srgbClr val="5f5f5f"/>
@@ -3319,16 +3319,8 @@
                 </a:solidFill>
                 <a:latin typeface="Arial"/>
               </a:rPr>
-              <a:t>- RDF-Entscheidungen</a:t>
-            </a:r>
-            <a:endParaRPr/>
-          </a:p>
-          <a:p>
-            <a:pPr>
-              <a:lnSpc>
-                <a:spcPct val="100000"/>
-              </a:lnSpc>
-            </a:pPr>
+              <a:t>- RDF-Layout optimiert</a:t>
+            </a:r>
             <a:endParaRPr/>
           </a:p>
           <a:p>
@@ -3421,14 +3413,6 @@
                 <a:spcPct val="100000"/>
               </a:lnSpc>
             </a:pPr>
-            <a:endParaRPr/>
-          </a:p>
-          <a:p>
-            <a:pPr>
-              <a:lnSpc>
-                <a:spcPct val="100000"/>
-              </a:lnSpc>
-            </a:pPr>
             <a:r>
               <a:rPr b="1" lang="en-US">
                 <a:solidFill>
@@ -3472,6 +3456,15 @@
                 <a:spcPct val="100000"/>
               </a:lnSpc>
             </a:pPr>
+            <a:r>
+              <a:rPr lang="en-US">
+                <a:solidFill>
+                  <a:srgbClr val="000000"/>
+                </a:solidFill>
+                <a:latin typeface="Arial"/>
+              </a:rPr>
+              <a:t>- History</a:t>
+            </a:r>
             <a:endParaRPr/>
           </a:p>
           <a:p>

</xml_diff>